<commit_message>
fix typos in OOP presentation
</commit_message>
<xml_diff>
--- a/CSTraining/Fundamentals/Python - OOP.pptx
+++ b/CSTraining/Fundamentals/Python - OOP.pptx
@@ -201,7 +201,7 @@
           <a:p>
             <a:fld id="{FAF957FC-5175-49AC-8D2B-2F056FFFC1DD}" type="datetimeFigureOut">
               <a:rPr lang="en-US" smtClean="0"/>
-              <a:t>1/23/2018</a:t>
+              <a:t>4/2/2018</a:t>
             </a:fld>
             <a:endParaRPr lang="en-US"/>
           </a:p>
@@ -651,7 +651,7 @@
             <a:fld id="{1D8BD707-D9CF-40AE-B4C6-C98DA3205C09}" type="datetimeFigureOut">
               <a:rPr lang="en-US" smtClean="0"/>
               <a:pPr/>
-              <a:t>1/23/2018</a:t>
+              <a:t>4/2/2018</a:t>
             </a:fld>
             <a:endParaRPr lang="en-US"/>
           </a:p>
@@ -818,7 +818,7 @@
             <a:fld id="{1D8BD707-D9CF-40AE-B4C6-C98DA3205C09}" type="datetimeFigureOut">
               <a:rPr lang="en-US" smtClean="0"/>
               <a:pPr/>
-              <a:t>1/23/2018</a:t>
+              <a:t>4/2/2018</a:t>
             </a:fld>
             <a:endParaRPr lang="en-US"/>
           </a:p>
@@ -995,7 +995,7 @@
             <a:fld id="{1D8BD707-D9CF-40AE-B4C6-C98DA3205C09}" type="datetimeFigureOut">
               <a:rPr lang="en-US" smtClean="0"/>
               <a:pPr/>
-              <a:t>1/23/2018</a:t>
+              <a:t>4/2/2018</a:t>
             </a:fld>
             <a:endParaRPr lang="en-US"/>
           </a:p>
@@ -1162,7 +1162,7 @@
             <a:fld id="{1D8BD707-D9CF-40AE-B4C6-C98DA3205C09}" type="datetimeFigureOut">
               <a:rPr lang="en-US" smtClean="0"/>
               <a:pPr/>
-              <a:t>1/23/2018</a:t>
+              <a:t>4/2/2018</a:t>
             </a:fld>
             <a:endParaRPr lang="en-US"/>
           </a:p>
@@ -1405,7 +1405,7 @@
             <a:fld id="{1D8BD707-D9CF-40AE-B4C6-C98DA3205C09}" type="datetimeFigureOut">
               <a:rPr lang="en-US" smtClean="0"/>
               <a:pPr/>
-              <a:t>1/23/2018</a:t>
+              <a:t>4/2/2018</a:t>
             </a:fld>
             <a:endParaRPr lang="en-US"/>
           </a:p>
@@ -1690,7 +1690,7 @@
             <a:fld id="{1D8BD707-D9CF-40AE-B4C6-C98DA3205C09}" type="datetimeFigureOut">
               <a:rPr lang="en-US" smtClean="0"/>
               <a:pPr/>
-              <a:t>1/23/2018</a:t>
+              <a:t>4/2/2018</a:t>
             </a:fld>
             <a:endParaRPr lang="en-US"/>
           </a:p>
@@ -2109,7 +2109,7 @@
             <a:fld id="{1D8BD707-D9CF-40AE-B4C6-C98DA3205C09}" type="datetimeFigureOut">
               <a:rPr lang="en-US" smtClean="0"/>
               <a:pPr/>
-              <a:t>1/23/2018</a:t>
+              <a:t>4/2/2018</a:t>
             </a:fld>
             <a:endParaRPr lang="en-US"/>
           </a:p>
@@ -2224,7 +2224,7 @@
             <a:fld id="{1D8BD707-D9CF-40AE-B4C6-C98DA3205C09}" type="datetimeFigureOut">
               <a:rPr lang="en-US" smtClean="0"/>
               <a:pPr/>
-              <a:t>1/23/2018</a:t>
+              <a:t>4/2/2018</a:t>
             </a:fld>
             <a:endParaRPr lang="en-US"/>
           </a:p>
@@ -2316,7 +2316,7 @@
             <a:fld id="{1D8BD707-D9CF-40AE-B4C6-C98DA3205C09}" type="datetimeFigureOut">
               <a:rPr lang="en-US" smtClean="0"/>
               <a:pPr/>
-              <a:t>1/23/2018</a:t>
+              <a:t>4/2/2018</a:t>
             </a:fld>
             <a:endParaRPr lang="en-US"/>
           </a:p>
@@ -2590,7 +2590,7 @@
             <a:fld id="{1D8BD707-D9CF-40AE-B4C6-C98DA3205C09}" type="datetimeFigureOut">
               <a:rPr lang="en-US" smtClean="0"/>
               <a:pPr/>
-              <a:t>1/23/2018</a:t>
+              <a:t>4/2/2018</a:t>
             </a:fld>
             <a:endParaRPr lang="en-US"/>
           </a:p>
@@ -2840,7 +2840,7 @@
             <a:fld id="{1D8BD707-D9CF-40AE-B4C6-C98DA3205C09}" type="datetimeFigureOut">
               <a:rPr lang="en-US" smtClean="0"/>
               <a:pPr/>
-              <a:t>1/23/2018</a:t>
+              <a:t>4/2/2018</a:t>
             </a:fld>
             <a:endParaRPr lang="en-US"/>
           </a:p>
@@ -3050,7 +3050,7 @@
             <a:fld id="{1D8BD707-D9CF-40AE-B4C6-C98DA3205C09}" type="datetimeFigureOut">
               <a:rPr lang="en-US" smtClean="0"/>
               <a:pPr/>
-              <a:t>1/23/2018</a:t>
+              <a:t>4/2/2018</a:t>
             </a:fld>
             <a:endParaRPr lang="en-US"/>
           </a:p>
@@ -5838,11 +5838,7 @@
             </a:r>
             <a:r>
               <a:rPr lang="en-US" dirty="0" err="1" smtClean="0"/>
-              <a:t>self</a:t>
-            </a:r>
-            <a:r>
-              <a:rPr lang="en-US" dirty="0" err="1" smtClean="0"/>
-              <a:t>._key</a:t>
+              <a:t>self._key</a:t>
             </a:r>
             <a:endParaRPr lang="en-US" dirty="0" smtClean="0"/>
           </a:p>
@@ -5857,19 +5853,11 @@
             </a:r>
             <a:r>
               <a:rPr lang="en-US" dirty="0" err="1" smtClean="0"/>
-              <a:t>self</a:t>
-            </a:r>
-            <a:r>
-              <a:rPr lang="en-US" dirty="0" err="1" smtClean="0"/>
-              <a:t>._key</a:t>
+              <a:t>self._key</a:t>
             </a:r>
             <a:r>
               <a:rPr lang="en-US" dirty="0" smtClean="0"/>
-              <a:t> </a:t>
-            </a:r>
-            <a:r>
-              <a:rPr lang="en-US" dirty="0" smtClean="0"/>
-              <a:t>= key</a:t>
+              <a:t> = key</a:t>
             </a:r>
             <a:endParaRPr lang="en-US" dirty="0"/>
           </a:p>
@@ -6532,13 +6520,8 @@
             </a:r>
             <a:r>
               <a:rPr lang="en-US" sz="1400" b="1" dirty="0" smtClean="0"/>
-              <a:t>self, flag </a:t>
-            </a:r>
-            <a:r>
-              <a:rPr lang="en-US" sz="1400" b="1" dirty="0" smtClean="0"/>
-              <a:t>):</a:t>
-            </a:r>
-            <a:endParaRPr lang="en-US" sz="1400" b="1" dirty="0" smtClean="0"/>
+              <a:t>self, flag ):</a:t>
+            </a:r>
           </a:p>
           <a:p>
             <a:r>
@@ -7702,7 +7685,7 @@
                   </a:schemeClr>
                 </a:solidFill>
               </a:rPr>
-              <a:t>	Next()		</a:t>
+              <a:t>	next()		</a:t>
             </a:r>
             <a:r>
               <a:rPr lang="en-US" sz="2400" b="1" dirty="0" smtClean="0">
@@ -7732,7 +7715,7 @@
                   </a:schemeClr>
                 </a:solidFill>
               </a:rPr>
-              <a:t>Next(</a:t>
+              <a:t>next(</a:t>
             </a:r>
             <a:r>
               <a:rPr lang="en-US" sz="2400" b="1" dirty="0" err="1" smtClean="0">
@@ -7795,7 +7778,7 @@
         <p:spPr>
           <a:xfrm>
             <a:off x="2971722" y="4936846"/>
-            <a:ext cx="2362122" cy="1815882"/>
+            <a:ext cx="2477858" cy="1815882"/>
           </a:xfrm>
           <a:prstGeom prst="rect">
             <a:avLst/>
@@ -7830,8 +7813,13 @@
             </a:r>
             <a:r>
               <a:rPr lang="en-US" sz="1600" dirty="0" smtClean="0"/>
-              <a:t> Next( self, next )</a:t>
-            </a:r>
+              <a:t> next( self, </a:t>
+            </a:r>
+            <a:r>
+              <a:rPr lang="en-US" sz="1600" smtClean="0"/>
+              <a:t>next ):</a:t>
+            </a:r>
+            <a:endParaRPr lang="en-US" sz="1600" dirty="0" smtClean="0"/>
           </a:p>
           <a:p>
             <a:r>
@@ -7840,7 +7828,7 @@
             </a:r>
             <a:r>
               <a:rPr lang="en-US" sz="1600" dirty="0" err="1" smtClean="0"/>
-              <a:t>self.next</a:t>
+              <a:t>self._next</a:t>
             </a:r>
             <a:r>
               <a:rPr lang="en-US" sz="1600" dirty="0" smtClean="0"/>
@@ -7888,11 +7876,11 @@
             </a:r>
             <a:r>
               <a:rPr lang="en-US" sz="1600" dirty="0" err="1" smtClean="0"/>
-              <a:t>GetNext</a:t>
+              <a:t>get_next</a:t>
             </a:r>
             <a:r>
               <a:rPr lang="en-US" sz="1600" dirty="0" smtClean="0"/>
-              <a:t>(self)</a:t>
+              <a:t>(self):</a:t>
             </a:r>
           </a:p>
           <a:p>
@@ -7916,7 +7904,7 @@
             </a:r>
             <a:r>
               <a:rPr lang="en-US" sz="1600" dirty="0" err="1" smtClean="0"/>
-              <a:t>self.next</a:t>
+              <a:t>self._next</a:t>
             </a:r>
             <a:endParaRPr lang="en-US" sz="1600" dirty="0" smtClean="0"/>
           </a:p>
@@ -8278,11 +8266,7 @@
             </a:r>
             <a:r>
               <a:rPr lang="en-US" sz="1600" dirty="0" smtClean="0"/>
-              <a:t>next</a:t>
-            </a:r>
-            <a:r>
-              <a:rPr lang="en-US" sz="1600" dirty="0" smtClean="0"/>
-              <a:t>( self, next = </a:t>
+              <a:t>next( self, next = </a:t>
             </a:r>
             <a:r>
               <a:rPr lang="en-US" sz="1600" dirty="0" smtClean="0">
@@ -8358,11 +8342,7 @@
             </a:r>
             <a:r>
               <a:rPr lang="en-US" sz="1600" dirty="0" err="1" smtClean="0"/>
-              <a:t>self</a:t>
-            </a:r>
-            <a:r>
-              <a:rPr lang="en-US" sz="1600" dirty="0" err="1" smtClean="0"/>
-              <a:t>._next</a:t>
+              <a:t>self._next</a:t>
             </a:r>
             <a:endParaRPr lang="en-US" sz="1600" dirty="0" smtClean="0"/>
           </a:p>
@@ -8373,19 +8353,11 @@
             </a:r>
             <a:r>
               <a:rPr lang="en-US" sz="1600" dirty="0" err="1" smtClean="0"/>
-              <a:t>self</a:t>
-            </a:r>
-            <a:r>
-              <a:rPr lang="en-US" sz="1600" dirty="0" err="1" smtClean="0"/>
-              <a:t>._next</a:t>
+              <a:t>self._next</a:t>
             </a:r>
             <a:r>
               <a:rPr lang="en-US" sz="1600" dirty="0" smtClean="0"/>
-              <a:t> </a:t>
-            </a:r>
-            <a:r>
-              <a:rPr lang="en-US" sz="1600" dirty="0" smtClean="0"/>
-              <a:t>= next</a:t>
+              <a:t> = next</a:t>
             </a:r>
           </a:p>
           <a:p>
@@ -8884,7 +8856,7 @@
                   <a:srgbClr val="0070C0"/>
                 </a:solidFill>
               </a:rPr>
-              <a:t>Class </a:t>
+              <a:t>class </a:t>
             </a:r>
             <a:r>
               <a:rPr lang="en-US" sz="1600" dirty="0" smtClean="0"/>
@@ -8976,11 +8948,7 @@
             </a:r>
             <a:r>
               <a:rPr lang="en-US" sz="1600" dirty="0" err="1" smtClean="0"/>
-              <a:t>self</a:t>
-            </a:r>
-            <a:r>
-              <a:rPr lang="en-US" sz="1600" dirty="0" err="1" smtClean="0"/>
-              <a:t>._next</a:t>
+              <a:t>self._next</a:t>
             </a:r>
             <a:endParaRPr lang="en-US" sz="1600" dirty="0" smtClean="0"/>
           </a:p>
@@ -9049,15 +9017,7 @@
             </a:r>
             <a:r>
               <a:rPr lang="en-US" sz="1600" dirty="0" smtClean="0"/>
-              <a:t>next(self</a:t>
-            </a:r>
-            <a:r>
-              <a:rPr lang="en-US" sz="1600" dirty="0" smtClean="0"/>
-              <a:t>, next</a:t>
-            </a:r>
-            <a:r>
-              <a:rPr lang="en-US" sz="1600" dirty="0" smtClean="0"/>
-              <a:t>):</a:t>
+              <a:t>next(self, next):</a:t>
             </a:r>
             <a:br>
               <a:rPr lang="en-US" sz="1600" dirty="0" smtClean="0"/>
@@ -9068,19 +9028,11 @@
             </a:r>
             <a:r>
               <a:rPr lang="en-US" sz="1600" dirty="0" err="1" smtClean="0"/>
-              <a:t>self</a:t>
-            </a:r>
-            <a:r>
-              <a:rPr lang="en-US" sz="1600" dirty="0" err="1" smtClean="0"/>
-              <a:t>._next</a:t>
+              <a:t>self._next</a:t>
             </a:r>
             <a:r>
               <a:rPr lang="en-US" sz="1600" dirty="0" smtClean="0"/>
-              <a:t> </a:t>
-            </a:r>
-            <a:r>
-              <a:rPr lang="en-US" sz="1600" dirty="0" smtClean="0"/>
-              <a:t>= next</a:t>
+              <a:t> = next</a:t>
             </a:r>
           </a:p>
           <a:p>
@@ -9102,16 +9054,12 @@
               <a:t> = </a:t>
             </a:r>
             <a:r>
-              <a:rPr lang="en-US" sz="1600" dirty="0" smtClean="0">
-                <a:solidFill>
-                  <a:srgbClr val="0070C0"/>
-                </a:solidFill>
-              </a:rPr>
-              <a:t>new</a:t>
-            </a:r>
-            <a:r>
               <a:rPr lang="en-US" sz="1600" dirty="0" smtClean="0"/>
-              <a:t> Node()</a:t>
+              <a:t>Node</a:t>
+            </a:r>
+            <a:r>
+              <a:rPr lang="en-US" sz="1600" dirty="0" smtClean="0"/>
+              <a:t>()</a:t>
             </a:r>
             <a:br>
               <a:rPr lang="en-US" sz="1600" dirty="0" smtClean="0"/>

</xml_diff>

<commit_message>
download script for competition
</commit_message>
<xml_diff>
--- a/CSTraining/Fundamentals/Python - OOP.pptx
+++ b/CSTraining/Fundamentals/Python - OOP.pptx
@@ -6665,9 +6665,25 @@
             </a:br>
             <a:r>
               <a:rPr lang="en-US" sz="1400" b="1" dirty="0" smtClean="0"/>
-              <a:t>			flag = True</a:t>
-            </a:r>
-            <a:endParaRPr lang="en-US" sz="2400" b="1" dirty="0" smtClean="0"/>
+              <a:t>			flag = </a:t>
+            </a:r>
+            <a:r>
+              <a:rPr lang="en-US" sz="1400" b="1" dirty="0" smtClean="0">
+                <a:solidFill>
+                  <a:schemeClr val="accent5">
+                    <a:lumMod val="75000"/>
+                  </a:schemeClr>
+                </a:solidFill>
+              </a:rPr>
+              <a:t>True</a:t>
+            </a:r>
+            <a:endParaRPr lang="en-US" sz="2400" b="1" dirty="0" smtClean="0">
+              <a:solidFill>
+                <a:schemeClr val="accent5">
+                  <a:lumMod val="75000"/>
+                </a:schemeClr>
+              </a:solidFill>
+            </a:endParaRPr>
           </a:p>
           <a:p>
             <a:pPr marL="285750" indent="-285750">
@@ -9051,15 +9067,7 @@
             </a:r>
             <a:r>
               <a:rPr lang="en-US" sz="1600" dirty="0" smtClean="0"/>
-              <a:t> = </a:t>
-            </a:r>
-            <a:r>
-              <a:rPr lang="en-US" sz="1600" dirty="0" smtClean="0"/>
-              <a:t>Node</a:t>
-            </a:r>
-            <a:r>
-              <a:rPr lang="en-US" sz="1600" dirty="0" smtClean="0"/>
-              <a:t>()</a:t>
+              <a:t> = Node()</a:t>
             </a:r>
             <a:br>
               <a:rPr lang="en-US" sz="1600" dirty="0" smtClean="0"/>

</xml_diff>